<commit_message>
Update banner and title.
</commit_message>
<xml_diff>
--- a/raw/banner/banner.pptx
+++ b/raw/banner/banner.pptx
@@ -114,6 +114,9 @@
         </p14:section>
       </p14:sectionLst>
     </p:ext>
+    <p:ext uri="{EFAFB233-063F-42B5-8137-9DF3F51BA10A}">
+      <p15:sldGuideLst xmlns:p15="http://schemas.microsoft.com/office/powerpoint/2012/main"/>
+    </p:ext>
   </p:extLst>
 </p:presentation>
 </file>
@@ -168,7 +171,7 @@
           <a:noFill/>
           <a:extLst>
             <a:ext uri="{909E8E84-426E-40dd-AFC4-6F175D3DCCD1}">
-              <a14:hiddenFill xmlns="" xmlns:a14="http://schemas.microsoft.com/office/drawing/2010/main">
+              <a14:hiddenFill xmlns:a14="http://schemas.microsoft.com/office/drawing/2010/main" xmlns="">
                 <a:solidFill>
                   <a:srgbClr val="FFFFFF"/>
                 </a:solidFill>
@@ -228,7 +231,7 @@
             </a:ln>
             <a:extLst>
               <a:ext uri="{91240B29-F687-4f45-9708-019B960494DF}">
-                <a14:hiddenLine xmlns="" xmlns:a14="http://schemas.microsoft.com/office/drawing/2010/main" w="9525">
+                <a14:hiddenLine xmlns:a14="http://schemas.microsoft.com/office/drawing/2010/main" xmlns="" w="9525">
                   <a:solidFill>
                     <a:srgbClr val="000000"/>
                   </a:solidFill>
@@ -318,7 +321,7 @@
             </a:ln>
             <a:extLst>
               <a:ext uri="{91240B29-F687-4f45-9708-019B960494DF}">
-                <a14:hiddenLine xmlns="" xmlns:a14="http://schemas.microsoft.com/office/drawing/2010/main" w="9525">
+                <a14:hiddenLine xmlns:a14="http://schemas.microsoft.com/office/drawing/2010/main" xmlns="" w="9525">
                   <a:solidFill>
                     <a:srgbClr val="000000"/>
                   </a:solidFill>
@@ -408,7 +411,7 @@
             </a:ln>
             <a:extLst>
               <a:ext uri="{91240B29-F687-4f45-9708-019B960494DF}">
-                <a14:hiddenLine xmlns="" xmlns:a14="http://schemas.microsoft.com/office/drawing/2010/main" w="9525">
+                <a14:hiddenLine xmlns:a14="http://schemas.microsoft.com/office/drawing/2010/main" xmlns="" w="9525">
                   <a:solidFill>
                     <a:srgbClr val="000000"/>
                   </a:solidFill>
@@ -442,7 +445,7 @@
             </a:ln>
             <a:extLst>
               <a:ext uri="{91240B29-F687-4f45-9708-019B960494DF}">
-                <a14:hiddenLine xmlns="" xmlns:a14="http://schemas.microsoft.com/office/drawing/2010/main" w="9525">
+                <a14:hiddenLine xmlns:a14="http://schemas.microsoft.com/office/drawing/2010/main" xmlns="" w="9525">
                   <a:solidFill>
                     <a:srgbClr val="000000"/>
                   </a:solidFill>
@@ -532,7 +535,7 @@
             </a:ln>
             <a:extLst>
               <a:ext uri="{91240B29-F687-4f45-9708-019B960494DF}">
-                <a14:hiddenLine xmlns="" xmlns:a14="http://schemas.microsoft.com/office/drawing/2010/main" w="9525">
+                <a14:hiddenLine xmlns:a14="http://schemas.microsoft.com/office/drawing/2010/main" xmlns="" w="9525">
                   <a:solidFill>
                     <a:srgbClr val="000000"/>
                   </a:solidFill>
@@ -594,7 +597,7 @@
             </a:ln>
             <a:extLst>
               <a:ext uri="{91240B29-F687-4f45-9708-019B960494DF}">
-                <a14:hiddenLine xmlns="" xmlns:a14="http://schemas.microsoft.com/office/drawing/2010/main" w="9525">
+                <a14:hiddenLine xmlns:a14="http://schemas.microsoft.com/office/drawing/2010/main" xmlns="" w="9525">
                   <a:solidFill>
                     <a:srgbClr val="000000"/>
                   </a:solidFill>
@@ -656,7 +659,7 @@
             </a:ln>
             <a:extLst>
               <a:ext uri="{91240B29-F687-4f45-9708-019B960494DF}">
-                <a14:hiddenLine xmlns="" xmlns:a14="http://schemas.microsoft.com/office/drawing/2010/main" w="9525">
+                <a14:hiddenLine xmlns:a14="http://schemas.microsoft.com/office/drawing/2010/main" xmlns="" w="9525">
                   <a:solidFill>
                     <a:srgbClr val="000000"/>
                   </a:solidFill>
@@ -746,7 +749,7 @@
             </a:ln>
             <a:extLst>
               <a:ext uri="{91240B29-F687-4f45-9708-019B960494DF}">
-                <a14:hiddenLine xmlns="" xmlns:a14="http://schemas.microsoft.com/office/drawing/2010/main" w="9525">
+                <a14:hiddenLine xmlns:a14="http://schemas.microsoft.com/office/drawing/2010/main" xmlns="" w="9525">
                   <a:solidFill>
                     <a:srgbClr val="000000"/>
                   </a:solidFill>
@@ -808,7 +811,7 @@
             </a:ln>
             <a:extLst>
               <a:ext uri="{91240B29-F687-4f45-9708-019B960494DF}">
-                <a14:hiddenLine xmlns="" xmlns:a14="http://schemas.microsoft.com/office/drawing/2010/main" w="9525">
+                <a14:hiddenLine xmlns:a14="http://schemas.microsoft.com/office/drawing/2010/main" xmlns="" w="9525">
                   <a:solidFill>
                     <a:srgbClr val="000000"/>
                   </a:solidFill>
@@ -870,7 +873,7 @@
             </a:ln>
             <a:extLst>
               <a:ext uri="{91240B29-F687-4f45-9708-019B960494DF}">
-                <a14:hiddenLine xmlns="" xmlns:a14="http://schemas.microsoft.com/office/drawing/2010/main" w="9525">
+                <a14:hiddenLine xmlns:a14="http://schemas.microsoft.com/office/drawing/2010/main" xmlns="" w="9525">
                   <a:solidFill>
                     <a:srgbClr val="000000"/>
                   </a:solidFill>
@@ -960,7 +963,7 @@
             </a:ln>
             <a:extLst>
               <a:ext uri="{91240B29-F687-4f45-9708-019B960494DF}">
-                <a14:hiddenLine xmlns="" xmlns:a14="http://schemas.microsoft.com/office/drawing/2010/main" w="9525">
+                <a14:hiddenLine xmlns:a14="http://schemas.microsoft.com/office/drawing/2010/main" xmlns="" w="9525">
                   <a:solidFill>
                     <a:srgbClr val="000000"/>
                   </a:solidFill>
@@ -1050,7 +1053,7 @@
             </a:ln>
             <a:extLst>
               <a:ext uri="{91240B29-F687-4f45-9708-019B960494DF}">
-                <a14:hiddenLine xmlns="" xmlns:a14="http://schemas.microsoft.com/office/drawing/2010/main" w="9525">
+                <a14:hiddenLine xmlns:a14="http://schemas.microsoft.com/office/drawing/2010/main" xmlns="" w="9525">
                   <a:solidFill>
                     <a:srgbClr val="000000"/>
                   </a:solidFill>
@@ -1112,7 +1115,7 @@
             </a:ln>
             <a:extLst>
               <a:ext uri="{91240B29-F687-4f45-9708-019B960494DF}">
-                <a14:hiddenLine xmlns="" xmlns:a14="http://schemas.microsoft.com/office/drawing/2010/main" w="9525">
+                <a14:hiddenLine xmlns:a14="http://schemas.microsoft.com/office/drawing/2010/main" xmlns="" w="9525">
                   <a:solidFill>
                     <a:srgbClr val="000000"/>
                   </a:solidFill>
@@ -1222,7 +1225,7 @@
             </a:ln>
             <a:extLst>
               <a:ext uri="{91240B29-F687-4f45-9708-019B960494DF}">
-                <a14:hiddenLine xmlns="" xmlns:a14="http://schemas.microsoft.com/office/drawing/2010/main" w="9525">
+                <a14:hiddenLine xmlns:a14="http://schemas.microsoft.com/office/drawing/2010/main" xmlns="" w="9525">
                   <a:solidFill>
                     <a:srgbClr val="000000"/>
                   </a:solidFill>
@@ -1284,7 +1287,7 @@
             </a:ln>
             <a:extLst>
               <a:ext uri="{91240B29-F687-4f45-9708-019B960494DF}">
-                <a14:hiddenLine xmlns="" xmlns:a14="http://schemas.microsoft.com/office/drawing/2010/main" w="9525">
+                <a14:hiddenLine xmlns:a14="http://schemas.microsoft.com/office/drawing/2010/main" xmlns="" w="9525">
                   <a:solidFill>
                     <a:srgbClr val="000000"/>
                   </a:solidFill>
@@ -1374,7 +1377,7 @@
             </a:ln>
             <a:extLst>
               <a:ext uri="{91240B29-F687-4f45-9708-019B960494DF}">
-                <a14:hiddenLine xmlns="" xmlns:a14="http://schemas.microsoft.com/office/drawing/2010/main" w="9525">
+                <a14:hiddenLine xmlns:a14="http://schemas.microsoft.com/office/drawing/2010/main" xmlns="" w="9525">
                   <a:solidFill>
                     <a:srgbClr val="000000"/>
                   </a:solidFill>
@@ -1464,7 +1467,7 @@
             </a:ln>
             <a:extLst>
               <a:ext uri="{91240B29-F687-4f45-9708-019B960494DF}">
-                <a14:hiddenLine xmlns="" xmlns:a14="http://schemas.microsoft.com/office/drawing/2010/main" w="9525">
+                <a14:hiddenLine xmlns:a14="http://schemas.microsoft.com/office/drawing/2010/main" xmlns="" w="9525">
                   <a:solidFill>
                     <a:srgbClr val="000000"/>
                   </a:solidFill>
@@ -1526,7 +1529,7 @@
             </a:ln>
             <a:extLst>
               <a:ext uri="{91240B29-F687-4f45-9708-019B960494DF}">
-                <a14:hiddenLine xmlns="" xmlns:a14="http://schemas.microsoft.com/office/drawing/2010/main" w="9525">
+                <a14:hiddenLine xmlns:a14="http://schemas.microsoft.com/office/drawing/2010/main" xmlns="" w="9525">
                   <a:solidFill>
                     <a:srgbClr val="000000"/>
                   </a:solidFill>
@@ -1616,7 +1619,7 @@
             </a:ln>
             <a:extLst>
               <a:ext uri="{91240B29-F687-4f45-9708-019B960494DF}">
-                <a14:hiddenLine xmlns="" xmlns:a14="http://schemas.microsoft.com/office/drawing/2010/main" w="9525">
+                <a14:hiddenLine xmlns:a14="http://schemas.microsoft.com/office/drawing/2010/main" xmlns="" w="9525">
                   <a:solidFill>
                     <a:srgbClr val="000000"/>
                   </a:solidFill>
@@ -1706,7 +1709,7 @@
             </a:ln>
             <a:extLst>
               <a:ext uri="{91240B29-F687-4f45-9708-019B960494DF}">
-                <a14:hiddenLine xmlns="" xmlns:a14="http://schemas.microsoft.com/office/drawing/2010/main" w="9525">
+                <a14:hiddenLine xmlns:a14="http://schemas.microsoft.com/office/drawing/2010/main" xmlns="" w="9525">
                   <a:solidFill>
                     <a:srgbClr val="000000"/>
                   </a:solidFill>
@@ -1762,7 +1765,7 @@
             </a:ln>
             <a:extLst>
               <a:ext uri="{91240B29-F687-4f45-9708-019B960494DF}">
-                <a14:hiddenLine xmlns="" xmlns:a14="http://schemas.microsoft.com/office/drawing/2010/main" w="9525">
+                <a14:hiddenLine xmlns:a14="http://schemas.microsoft.com/office/drawing/2010/main" xmlns="" w="9525">
                   <a:solidFill>
                     <a:srgbClr val="000000"/>
                   </a:solidFill>
@@ -1852,7 +1855,7 @@
             </a:ln>
             <a:extLst>
               <a:ext uri="{91240B29-F687-4f45-9708-019B960494DF}">
-                <a14:hiddenLine xmlns="" xmlns:a14="http://schemas.microsoft.com/office/drawing/2010/main" w="9525">
+                <a14:hiddenLine xmlns:a14="http://schemas.microsoft.com/office/drawing/2010/main" xmlns="" w="9525">
                   <a:solidFill>
                     <a:srgbClr val="000000"/>
                   </a:solidFill>
@@ -1908,7 +1911,7 @@
             </a:ln>
             <a:extLst>
               <a:ext uri="{91240B29-F687-4f45-9708-019B960494DF}">
-                <a14:hiddenLine xmlns="" xmlns:a14="http://schemas.microsoft.com/office/drawing/2010/main" w="9525">
+                <a14:hiddenLine xmlns:a14="http://schemas.microsoft.com/office/drawing/2010/main" xmlns="" w="9525">
                   <a:solidFill>
                     <a:srgbClr val="000000"/>
                   </a:solidFill>
@@ -1998,7 +2001,7 @@
             </a:ln>
             <a:extLst>
               <a:ext uri="{91240B29-F687-4f45-9708-019B960494DF}">
-                <a14:hiddenLine xmlns="" xmlns:a14="http://schemas.microsoft.com/office/drawing/2010/main" w="9525">
+                <a14:hiddenLine xmlns:a14="http://schemas.microsoft.com/office/drawing/2010/main" xmlns="" w="9525">
                   <a:solidFill>
                     <a:srgbClr val="000000"/>
                   </a:solidFill>
@@ -2066,7 +2069,7 @@
             </a:ln>
             <a:extLst>
               <a:ext uri="{91240B29-F687-4f45-9708-019B960494DF}">
-                <a14:hiddenLine xmlns="" xmlns:a14="http://schemas.microsoft.com/office/drawing/2010/main" w="9525">
+                <a14:hiddenLine xmlns:a14="http://schemas.microsoft.com/office/drawing/2010/main" xmlns="" w="9525">
                   <a:solidFill>
                     <a:srgbClr val="000000"/>
                   </a:solidFill>
@@ -2156,7 +2159,7 @@
             </a:ln>
             <a:extLst>
               <a:ext uri="{91240B29-F687-4f45-9708-019B960494DF}">
-                <a14:hiddenLine xmlns="" xmlns:a14="http://schemas.microsoft.com/office/drawing/2010/main" w="9525">
+                <a14:hiddenLine xmlns:a14="http://schemas.microsoft.com/office/drawing/2010/main" xmlns="" w="9525">
                   <a:solidFill>
                     <a:srgbClr val="000000"/>
                   </a:solidFill>
@@ -2224,7 +2227,7 @@
             </a:ln>
             <a:extLst>
               <a:ext uri="{91240B29-F687-4f45-9708-019B960494DF}">
-                <a14:hiddenLine xmlns="" xmlns:a14="http://schemas.microsoft.com/office/drawing/2010/main" w="9525">
+                <a14:hiddenLine xmlns:a14="http://schemas.microsoft.com/office/drawing/2010/main" xmlns="" w="9525">
                   <a:solidFill>
                     <a:srgbClr val="000000"/>
                   </a:solidFill>
@@ -2314,7 +2317,7 @@
             </a:ln>
             <a:extLst>
               <a:ext uri="{91240B29-F687-4f45-9708-019B960494DF}">
-                <a14:hiddenLine xmlns="" xmlns:a14="http://schemas.microsoft.com/office/drawing/2010/main" w="9525">
+                <a14:hiddenLine xmlns:a14="http://schemas.microsoft.com/office/drawing/2010/main" xmlns="" w="9525">
                   <a:solidFill>
                     <a:srgbClr val="000000"/>
                   </a:solidFill>
@@ -2348,7 +2351,7 @@
             </a:ln>
             <a:extLst>
               <a:ext uri="{91240B29-F687-4f45-9708-019B960494DF}">
-                <a14:hiddenLine xmlns="" xmlns:a14="http://schemas.microsoft.com/office/drawing/2010/main" w="9525">
+                <a14:hiddenLine xmlns:a14="http://schemas.microsoft.com/office/drawing/2010/main" xmlns="" w="9525">
                   <a:solidFill>
                     <a:srgbClr val="000000"/>
                   </a:solidFill>
@@ -2438,7 +2441,7 @@
             </a:ln>
             <a:extLst>
               <a:ext uri="{91240B29-F687-4f45-9708-019B960494DF}">
-                <a14:hiddenLine xmlns="" xmlns:a14="http://schemas.microsoft.com/office/drawing/2010/main" w="9525">
+                <a14:hiddenLine xmlns:a14="http://schemas.microsoft.com/office/drawing/2010/main" xmlns="" w="9525">
                   <a:solidFill>
                     <a:srgbClr val="000000"/>
                   </a:solidFill>
@@ -2500,7 +2503,7 @@
             </a:ln>
             <a:extLst>
               <a:ext uri="{91240B29-F687-4f45-9708-019B960494DF}">
-                <a14:hiddenLine xmlns="" xmlns:a14="http://schemas.microsoft.com/office/drawing/2010/main" w="9525">
+                <a14:hiddenLine xmlns:a14="http://schemas.microsoft.com/office/drawing/2010/main" xmlns="" w="9525">
                   <a:solidFill>
                     <a:srgbClr val="000000"/>
                   </a:solidFill>
@@ -2562,7 +2565,7 @@
             </a:ln>
             <a:extLst>
               <a:ext uri="{91240B29-F687-4f45-9708-019B960494DF}">
-                <a14:hiddenLine xmlns="" xmlns:a14="http://schemas.microsoft.com/office/drawing/2010/main" w="9525">
+                <a14:hiddenLine xmlns:a14="http://schemas.microsoft.com/office/drawing/2010/main" xmlns="" w="9525">
                   <a:solidFill>
                     <a:srgbClr val="000000"/>
                   </a:solidFill>
@@ -2652,7 +2655,7 @@
             </a:ln>
             <a:extLst>
               <a:ext uri="{91240B29-F687-4f45-9708-019B960494DF}">
-                <a14:hiddenLine xmlns="" xmlns:a14="http://schemas.microsoft.com/office/drawing/2010/main" w="9525">
+                <a14:hiddenLine xmlns:a14="http://schemas.microsoft.com/office/drawing/2010/main" xmlns="" w="9525">
                   <a:solidFill>
                     <a:srgbClr val="000000"/>
                   </a:solidFill>
@@ -2720,7 +2723,7 @@
             </a:ln>
             <a:extLst>
               <a:ext uri="{91240B29-F687-4f45-9708-019B960494DF}">
-                <a14:hiddenLine xmlns="" xmlns:a14="http://schemas.microsoft.com/office/drawing/2010/main" w="9525">
+                <a14:hiddenLine xmlns:a14="http://schemas.microsoft.com/office/drawing/2010/main" xmlns="" w="9525">
                   <a:solidFill>
                     <a:srgbClr val="000000"/>
                   </a:solidFill>
@@ -2782,7 +2785,7 @@
             </a:ln>
             <a:extLst>
               <a:ext uri="{91240B29-F687-4f45-9708-019B960494DF}">
-                <a14:hiddenLine xmlns="" xmlns:a14="http://schemas.microsoft.com/office/drawing/2010/main" w="9525">
+                <a14:hiddenLine xmlns:a14="http://schemas.microsoft.com/office/drawing/2010/main" xmlns="" w="9525">
                   <a:solidFill>
                     <a:srgbClr val="000000"/>
                   </a:solidFill>
@@ -2872,7 +2875,7 @@
             </a:ln>
             <a:extLst>
               <a:ext uri="{91240B29-F687-4f45-9708-019B960494DF}">
-                <a14:hiddenLine xmlns="" xmlns:a14="http://schemas.microsoft.com/office/drawing/2010/main" w="9525">
+                <a14:hiddenLine xmlns:a14="http://schemas.microsoft.com/office/drawing/2010/main" xmlns="" w="9525">
                   <a:solidFill>
                     <a:srgbClr val="000000"/>
                   </a:solidFill>
@@ -2934,7 +2937,7 @@
             </a:ln>
             <a:extLst>
               <a:ext uri="{91240B29-F687-4f45-9708-019B960494DF}">
-                <a14:hiddenLine xmlns="" xmlns:a14="http://schemas.microsoft.com/office/drawing/2010/main" w="9525">
+                <a14:hiddenLine xmlns:a14="http://schemas.microsoft.com/office/drawing/2010/main" xmlns="" w="9525">
                   <a:solidFill>
                     <a:srgbClr val="000000"/>
                   </a:solidFill>
@@ -3024,7 +3027,7 @@
             </a:ln>
             <a:extLst>
               <a:ext uri="{91240B29-F687-4f45-9708-019B960494DF}">
-                <a14:hiddenLine xmlns="" xmlns:a14="http://schemas.microsoft.com/office/drawing/2010/main" w="9525">
+                <a14:hiddenLine xmlns:a14="http://schemas.microsoft.com/office/drawing/2010/main" xmlns="" w="9525">
                   <a:solidFill>
                     <a:srgbClr val="000000"/>
                   </a:solidFill>
@@ -3086,7 +3089,7 @@
             </a:ln>
             <a:extLst>
               <a:ext uri="{91240B29-F687-4f45-9708-019B960494DF}">
-                <a14:hiddenLine xmlns="" xmlns:a14="http://schemas.microsoft.com/office/drawing/2010/main" w="9525">
+                <a14:hiddenLine xmlns:a14="http://schemas.microsoft.com/office/drawing/2010/main" xmlns="" w="9525">
                   <a:solidFill>
                     <a:srgbClr val="000000"/>
                   </a:solidFill>
@@ -3176,7 +3179,7 @@
             </a:ln>
             <a:extLst>
               <a:ext uri="{91240B29-F687-4f45-9708-019B960494DF}">
-                <a14:hiddenLine xmlns="" xmlns:a14="http://schemas.microsoft.com/office/drawing/2010/main" w="9525">
+                <a14:hiddenLine xmlns:a14="http://schemas.microsoft.com/office/drawing/2010/main" xmlns="" w="9525">
                   <a:solidFill>
                     <a:srgbClr val="000000"/>
                   </a:solidFill>
@@ -3210,7 +3213,7 @@
             </a:ln>
             <a:extLst>
               <a:ext uri="{91240B29-F687-4f45-9708-019B960494DF}">
-                <a14:hiddenLine xmlns="" xmlns:a14="http://schemas.microsoft.com/office/drawing/2010/main" w="9525">
+                <a14:hiddenLine xmlns:a14="http://schemas.microsoft.com/office/drawing/2010/main" xmlns="" w="9525">
                   <a:solidFill>
                     <a:srgbClr val="000000"/>
                   </a:solidFill>
@@ -3275,7 +3278,7 @@
             </a:ln>
             <a:extLst>
               <a:ext uri="{91240B29-F687-4f45-9708-019B960494DF}">
-                <a14:hiddenLine xmlns="" xmlns:a14="http://schemas.microsoft.com/office/drawing/2010/main" w="9525">
+                <a14:hiddenLine xmlns:a14="http://schemas.microsoft.com/office/drawing/2010/main" xmlns="" w="9525">
                   <a:solidFill>
                     <a:srgbClr val="000000"/>
                   </a:solidFill>
@@ -3365,7 +3368,7 @@
             </a:ln>
             <a:extLst>
               <a:ext uri="{91240B29-F687-4f45-9708-019B960494DF}">
-                <a14:hiddenLine xmlns="" xmlns:a14="http://schemas.microsoft.com/office/drawing/2010/main" w="9525">
+                <a14:hiddenLine xmlns:a14="http://schemas.microsoft.com/office/drawing/2010/main" xmlns="" w="9525">
                   <a:solidFill>
                     <a:srgbClr val="000000"/>
                   </a:solidFill>
@@ -3427,7 +3430,7 @@
             </a:ln>
             <a:extLst>
               <a:ext uri="{91240B29-F687-4f45-9708-019B960494DF}">
-                <a14:hiddenLine xmlns="" xmlns:a14="http://schemas.microsoft.com/office/drawing/2010/main" w="9525">
+                <a14:hiddenLine xmlns:a14="http://schemas.microsoft.com/office/drawing/2010/main" xmlns="" w="9525">
                   <a:solidFill>
                     <a:srgbClr val="000000"/>
                   </a:solidFill>
@@ -3517,7 +3520,7 @@
             </a:ln>
             <a:extLst>
               <a:ext uri="{91240B29-F687-4f45-9708-019B960494DF}">
-                <a14:hiddenLine xmlns="" xmlns:a14="http://schemas.microsoft.com/office/drawing/2010/main" w="9525">
+                <a14:hiddenLine xmlns:a14="http://schemas.microsoft.com/office/drawing/2010/main" xmlns="" w="9525">
                   <a:solidFill>
                     <a:srgbClr val="000000"/>
                   </a:solidFill>
@@ -3607,7 +3610,7 @@
             </a:ln>
             <a:extLst>
               <a:ext uri="{91240B29-F687-4f45-9708-019B960494DF}">
-                <a14:hiddenLine xmlns="" xmlns:a14="http://schemas.microsoft.com/office/drawing/2010/main" w="9525">
+                <a14:hiddenLine xmlns:a14="http://schemas.microsoft.com/office/drawing/2010/main" xmlns="" w="9525">
                   <a:solidFill>
                     <a:srgbClr val="000000"/>
                   </a:solidFill>
@@ -3672,7 +3675,7 @@
             </a:ln>
             <a:extLst>
               <a:ext uri="{91240B29-F687-4f45-9708-019B960494DF}">
-                <a14:hiddenLine xmlns="" xmlns:a14="http://schemas.microsoft.com/office/drawing/2010/main" w="9525">
+                <a14:hiddenLine xmlns:a14="http://schemas.microsoft.com/office/drawing/2010/main" xmlns="" w="9525">
                   <a:solidFill>
                     <a:srgbClr val="000000"/>
                   </a:solidFill>
@@ -3734,7 +3737,7 @@
             </a:ln>
             <a:extLst>
               <a:ext uri="{91240B29-F687-4f45-9708-019B960494DF}">
-                <a14:hiddenLine xmlns="" xmlns:a14="http://schemas.microsoft.com/office/drawing/2010/main" w="9525">
+                <a14:hiddenLine xmlns:a14="http://schemas.microsoft.com/office/drawing/2010/main" xmlns="" w="9525">
                   <a:solidFill>
                     <a:srgbClr val="000000"/>
                   </a:solidFill>
@@ -3824,7 +3827,7 @@
             </a:ln>
             <a:extLst>
               <a:ext uri="{91240B29-F687-4f45-9708-019B960494DF}">
-                <a14:hiddenLine xmlns="" xmlns:a14="http://schemas.microsoft.com/office/drawing/2010/main" w="9525">
+                <a14:hiddenLine xmlns:a14="http://schemas.microsoft.com/office/drawing/2010/main" xmlns="" w="9525">
                   <a:solidFill>
                     <a:srgbClr val="000000"/>
                   </a:solidFill>
@@ -3914,7 +3917,7 @@
             </a:ln>
             <a:extLst>
               <a:ext uri="{91240B29-F687-4f45-9708-019B960494DF}">
-                <a14:hiddenLine xmlns="" xmlns:a14="http://schemas.microsoft.com/office/drawing/2010/main" w="9525">
+                <a14:hiddenLine xmlns:a14="http://schemas.microsoft.com/office/drawing/2010/main" xmlns="" w="9525">
                   <a:solidFill>
                     <a:srgbClr val="000000"/>
                   </a:solidFill>
@@ -3976,7 +3979,7 @@
             </a:ln>
             <a:extLst>
               <a:ext uri="{91240B29-F687-4f45-9708-019B960494DF}">
-                <a14:hiddenLine xmlns="" xmlns:a14="http://schemas.microsoft.com/office/drawing/2010/main" w="9525">
+                <a14:hiddenLine xmlns:a14="http://schemas.microsoft.com/office/drawing/2010/main" xmlns="" w="9525">
                   <a:solidFill>
                     <a:srgbClr val="000000"/>
                   </a:solidFill>
@@ -4096,7 +4099,7 @@
             </a:ln>
             <a:extLst>
               <a:ext uri="{91240B29-F687-4f45-9708-019B960494DF}">
-                <a14:hiddenLine xmlns="" xmlns:a14="http://schemas.microsoft.com/office/drawing/2010/main" w="9525">
+                <a14:hiddenLine xmlns:a14="http://schemas.microsoft.com/office/drawing/2010/main" xmlns="" w="9525">
                   <a:solidFill>
                     <a:srgbClr val="000000"/>
                   </a:solidFill>
@@ -4164,7 +4167,7 @@
             </a:ln>
             <a:extLst>
               <a:ext uri="{91240B29-F687-4f45-9708-019B960494DF}">
-                <a14:hiddenLine xmlns="" xmlns:a14="http://schemas.microsoft.com/office/drawing/2010/main" w="9525">
+                <a14:hiddenLine xmlns:a14="http://schemas.microsoft.com/office/drawing/2010/main" xmlns="" w="9525">
                   <a:solidFill>
                     <a:srgbClr val="000000"/>
                   </a:solidFill>
@@ -4254,7 +4257,7 @@
             </a:ln>
             <a:extLst>
               <a:ext uri="{91240B29-F687-4f45-9708-019B960494DF}">
-                <a14:hiddenLine xmlns="" xmlns:a14="http://schemas.microsoft.com/office/drawing/2010/main" w="9525">
+                <a14:hiddenLine xmlns:a14="http://schemas.microsoft.com/office/drawing/2010/main" xmlns="" w="9525">
                   <a:solidFill>
                     <a:srgbClr val="000000"/>
                   </a:solidFill>
@@ -4394,7 +4397,7 @@
           <a:p>
             <a:fld id="{B67AB8B5-4E7D-48C3-A5C4-9A764D4F2274}" type="datetimeFigureOut">
               <a:rPr lang="en-SG" smtClean="0"/>
-              <a:t>4/3/2024</a:t>
+              <a:t>30/4/2024</a:t>
             </a:fld>
             <a:endParaRPr lang="en-SG"/>
           </a:p>
@@ -4661,7 +4664,7 @@
           <a:p>
             <a:fld id="{B67AB8B5-4E7D-48C3-A5C4-9A764D4F2274}" type="datetimeFigureOut">
               <a:rPr lang="en-SG" smtClean="0"/>
-              <a:t>4/3/2024</a:t>
+              <a:t>30/4/2024</a:t>
             </a:fld>
             <a:endParaRPr lang="en-SG"/>
           </a:p>
@@ -4857,7 +4860,7 @@
           <a:p>
             <a:fld id="{B67AB8B5-4E7D-48C3-A5C4-9A764D4F2274}" type="datetimeFigureOut">
               <a:rPr lang="en-SG" smtClean="0"/>
-              <a:t>4/3/2024</a:t>
+              <a:t>30/4/2024</a:t>
             </a:fld>
             <a:endParaRPr lang="en-SG"/>
           </a:p>
@@ -5120,7 +5123,7 @@
           <a:p>
             <a:fld id="{B67AB8B5-4E7D-48C3-A5C4-9A764D4F2274}" type="datetimeFigureOut">
               <a:rPr lang="en-SG" smtClean="0"/>
-              <a:t>4/3/2024</a:t>
+              <a:t>30/4/2024</a:t>
             </a:fld>
             <a:endParaRPr lang="en-SG"/>
           </a:p>
@@ -5554,7 +5557,7 @@
           <a:p>
             <a:fld id="{B67AB8B5-4E7D-48C3-A5C4-9A764D4F2274}" type="datetimeFigureOut">
               <a:rPr lang="en-SG" smtClean="0"/>
-              <a:t>4/3/2024</a:t>
+              <a:t>30/4/2024</a:t>
             </a:fld>
             <a:endParaRPr lang="en-SG"/>
           </a:p>
@@ -6100,7 +6103,7 @@
           <a:p>
             <a:fld id="{B67AB8B5-4E7D-48C3-A5C4-9A764D4F2274}" type="datetimeFigureOut">
               <a:rPr lang="en-SG" smtClean="0"/>
-              <a:t>4/3/2024</a:t>
+              <a:t>30/4/2024</a:t>
             </a:fld>
             <a:endParaRPr lang="en-SG"/>
           </a:p>
@@ -6820,7 +6823,7 @@
           <a:p>
             <a:fld id="{B67AB8B5-4E7D-48C3-A5C4-9A764D4F2274}" type="datetimeFigureOut">
               <a:rPr lang="en-SG" smtClean="0"/>
-              <a:t>4/3/2024</a:t>
+              <a:t>30/4/2024</a:t>
             </a:fld>
             <a:endParaRPr lang="en-SG"/>
           </a:p>
@@ -6990,7 +6993,7 @@
           <a:p>
             <a:fld id="{B67AB8B5-4E7D-48C3-A5C4-9A764D4F2274}" type="datetimeFigureOut">
               <a:rPr lang="en-SG" smtClean="0"/>
-              <a:t>4/3/2024</a:t>
+              <a:t>30/4/2024</a:t>
             </a:fld>
             <a:endParaRPr lang="en-SG"/>
           </a:p>
@@ -7170,7 +7173,7 @@
           <a:p>
             <a:fld id="{B67AB8B5-4E7D-48C3-A5C4-9A764D4F2274}" type="datetimeFigureOut">
               <a:rPr lang="en-SG" smtClean="0"/>
-              <a:t>4/3/2024</a:t>
+              <a:t>30/4/2024</a:t>
             </a:fld>
             <a:endParaRPr lang="en-SG"/>
           </a:p>
@@ -7340,7 +7343,7 @@
           <a:p>
             <a:fld id="{B67AB8B5-4E7D-48C3-A5C4-9A764D4F2274}" type="datetimeFigureOut">
               <a:rPr lang="en-SG" smtClean="0"/>
-              <a:t>4/3/2024</a:t>
+              <a:t>30/4/2024</a:t>
             </a:fld>
             <a:endParaRPr lang="en-SG"/>
           </a:p>
@@ -7590,7 +7593,7 @@
           <a:p>
             <a:fld id="{B67AB8B5-4E7D-48C3-A5C4-9A764D4F2274}" type="datetimeFigureOut">
               <a:rPr lang="en-SG" smtClean="0"/>
-              <a:t>4/3/2024</a:t>
+              <a:t>30/4/2024</a:t>
             </a:fld>
             <a:endParaRPr lang="en-SG"/>
           </a:p>
@@ -7822,7 +7825,7 @@
           <a:p>
             <a:fld id="{B67AB8B5-4E7D-48C3-A5C4-9A764D4F2274}" type="datetimeFigureOut">
               <a:rPr lang="en-SG" smtClean="0"/>
-              <a:t>4/3/2024</a:t>
+              <a:t>30/4/2024</a:t>
             </a:fld>
             <a:endParaRPr lang="en-SG"/>
           </a:p>
@@ -8203,7 +8206,7 @@
           <a:p>
             <a:fld id="{B67AB8B5-4E7D-48C3-A5C4-9A764D4F2274}" type="datetimeFigureOut">
               <a:rPr lang="en-SG" smtClean="0"/>
-              <a:t>4/3/2024</a:t>
+              <a:t>30/4/2024</a:t>
             </a:fld>
             <a:endParaRPr lang="en-SG"/>
           </a:p>
@@ -8321,7 +8324,7 @@
           <a:p>
             <a:fld id="{B67AB8B5-4E7D-48C3-A5C4-9A764D4F2274}" type="datetimeFigureOut">
               <a:rPr lang="en-SG" smtClean="0"/>
-              <a:t>4/3/2024</a:t>
+              <a:t>30/4/2024</a:t>
             </a:fld>
             <a:endParaRPr lang="en-SG"/>
           </a:p>
@@ -8416,7 +8419,7 @@
           <a:p>
             <a:fld id="{B67AB8B5-4E7D-48C3-A5C4-9A764D4F2274}" type="datetimeFigureOut">
               <a:rPr lang="en-SG" smtClean="0"/>
-              <a:t>4/3/2024</a:t>
+              <a:t>30/4/2024</a:t>
             </a:fld>
             <a:endParaRPr lang="en-SG"/>
           </a:p>
@@ -8665,7 +8668,7 @@
           <a:p>
             <a:fld id="{B67AB8B5-4E7D-48C3-A5C4-9A764D4F2274}" type="datetimeFigureOut">
               <a:rPr lang="en-SG" smtClean="0"/>
-              <a:t>4/3/2024</a:t>
+              <a:t>30/4/2024</a:t>
             </a:fld>
             <a:endParaRPr lang="en-SG"/>
           </a:p>
@@ -8945,7 +8948,7 @@
           <a:p>
             <a:fld id="{B67AB8B5-4E7D-48C3-A5C4-9A764D4F2274}" type="datetimeFigureOut">
               <a:rPr lang="en-SG" smtClean="0"/>
-              <a:t>4/3/2024</a:t>
+              <a:t>30/4/2024</a:t>
             </a:fld>
             <a:endParaRPr lang="en-SG"/>
           </a:p>
@@ -9064,7 +9067,7 @@
           <a:noFill/>
           <a:extLst>
             <a:ext uri="{909E8E84-426E-40dd-AFC4-6F175D3DCCD1}">
-              <a14:hiddenFill xmlns="" xmlns:a14="http://schemas.microsoft.com/office/drawing/2010/main">
+              <a14:hiddenFill xmlns:a14="http://schemas.microsoft.com/office/drawing/2010/main" xmlns="">
                 <a:solidFill>
                   <a:srgbClr val="FFFFFF"/>
                 </a:solidFill>
@@ -9199,7 +9202,7 @@
           <a:p>
             <a:fld id="{B67AB8B5-4E7D-48C3-A5C4-9A764D4F2274}" type="datetimeFigureOut">
               <a:rPr lang="en-SG" smtClean="0"/>
-              <a:t>4/3/2024</a:t>
+              <a:t>30/4/2024</a:t>
             </a:fld>
             <a:endParaRPr lang="en-SG"/>
           </a:p>
@@ -9380,7 +9383,7 @@
             </a:ln>
             <a:extLst>
               <a:ext uri="{91240B29-F687-4f45-9708-019B960494DF}">
-                <a14:hiddenLine xmlns="" xmlns:a14="http://schemas.microsoft.com/office/drawing/2010/main" w="9525">
+                <a14:hiddenLine xmlns:a14="http://schemas.microsoft.com/office/drawing/2010/main" xmlns="" w="9525">
                   <a:solidFill>
                     <a:srgbClr val="000000"/>
                   </a:solidFill>
@@ -9501,7 +9504,7 @@
             </a:ln>
             <a:extLst>
               <a:ext uri="{91240B29-F687-4f45-9708-019B960494DF}">
-                <a14:hiddenLine xmlns="" xmlns:a14="http://schemas.microsoft.com/office/drawing/2010/main" w="9525">
+                <a14:hiddenLine xmlns:a14="http://schemas.microsoft.com/office/drawing/2010/main" xmlns="" w="9525">
                   <a:solidFill>
                     <a:srgbClr val="000000"/>
                   </a:solidFill>
@@ -9597,7 +9600,7 @@
             </a:ln>
             <a:extLst>
               <a:ext uri="{91240B29-F687-4f45-9708-019B960494DF}">
-                <a14:hiddenLine xmlns="" xmlns:a14="http://schemas.microsoft.com/office/drawing/2010/main" w="9525">
+                <a14:hiddenLine xmlns:a14="http://schemas.microsoft.com/office/drawing/2010/main" xmlns="" w="9525">
                   <a:solidFill>
                     <a:srgbClr val="000000"/>
                   </a:solidFill>
@@ -9668,7 +9671,7 @@
             </a:ln>
             <a:extLst>
               <a:ext uri="{91240B29-F687-4f45-9708-019B960494DF}">
-                <a14:hiddenLine xmlns="" xmlns:a14="http://schemas.microsoft.com/office/drawing/2010/main" w="9525">
+                <a14:hiddenLine xmlns:a14="http://schemas.microsoft.com/office/drawing/2010/main" xmlns="" w="9525">
                   <a:solidFill>
                     <a:srgbClr val="000000"/>
                   </a:solidFill>
@@ -9764,7 +9767,7 @@
             </a:ln>
             <a:extLst>
               <a:ext uri="{91240B29-F687-4f45-9708-019B960494DF}">
-                <a14:hiddenLine xmlns="" xmlns:a14="http://schemas.microsoft.com/office/drawing/2010/main" w="9525">
+                <a14:hiddenLine xmlns:a14="http://schemas.microsoft.com/office/drawing/2010/main" xmlns="" w="9525">
                   <a:solidFill>
                     <a:srgbClr val="000000"/>
                   </a:solidFill>
@@ -9838,7 +9841,7 @@
             </a:ln>
             <a:extLst>
               <a:ext uri="{91240B29-F687-4f45-9708-019B960494DF}">
-                <a14:hiddenLine xmlns="" xmlns:a14="http://schemas.microsoft.com/office/drawing/2010/main" w="9525">
+                <a14:hiddenLine xmlns:a14="http://schemas.microsoft.com/office/drawing/2010/main" xmlns="" w="9525">
                   <a:solidFill>
                     <a:srgbClr val="000000"/>
                   </a:solidFill>
@@ -9934,7 +9937,7 @@
             </a:ln>
             <a:extLst>
               <a:ext uri="{91240B29-F687-4f45-9708-019B960494DF}">
-                <a14:hiddenLine xmlns="" xmlns:a14="http://schemas.microsoft.com/office/drawing/2010/main" w="9525">
+                <a14:hiddenLine xmlns:a14="http://schemas.microsoft.com/office/drawing/2010/main" xmlns="" w="9525">
                   <a:solidFill>
                     <a:srgbClr val="000000"/>
                   </a:solidFill>
@@ -10008,7 +10011,7 @@
             </a:ln>
             <a:extLst>
               <a:ext uri="{91240B29-F687-4f45-9708-019B960494DF}">
-                <a14:hiddenLine xmlns="" xmlns:a14="http://schemas.microsoft.com/office/drawing/2010/main" w="9525">
+                <a14:hiddenLine xmlns:a14="http://schemas.microsoft.com/office/drawing/2010/main" xmlns="" w="9525">
                   <a:solidFill>
                     <a:srgbClr val="000000"/>
                   </a:solidFill>
@@ -10104,7 +10107,7 @@
             </a:ln>
             <a:extLst>
               <a:ext uri="{91240B29-F687-4f45-9708-019B960494DF}">
-                <a14:hiddenLine xmlns="" xmlns:a14="http://schemas.microsoft.com/office/drawing/2010/main" w="9525">
+                <a14:hiddenLine xmlns:a14="http://schemas.microsoft.com/office/drawing/2010/main" xmlns="" w="9525">
                   <a:solidFill>
                     <a:srgbClr val="000000"/>
                   </a:solidFill>
@@ -10144,7 +10147,7 @@
             </a:ln>
             <a:extLst>
               <a:ext uri="{91240B29-F687-4f45-9708-019B960494DF}">
-                <a14:hiddenLine xmlns="" xmlns:a14="http://schemas.microsoft.com/office/drawing/2010/main" w="9525">
+                <a14:hiddenLine xmlns:a14="http://schemas.microsoft.com/office/drawing/2010/main" xmlns="" w="9525">
                   <a:solidFill>
                     <a:srgbClr val="000000"/>
                   </a:solidFill>
@@ -10248,7 +10251,7 @@
             </a:ln>
             <a:extLst>
               <a:ext uri="{91240B29-F687-4f45-9708-019B960494DF}">
-                <a14:hiddenLine xmlns="" xmlns:a14="http://schemas.microsoft.com/office/drawing/2010/main" w="9525">
+                <a14:hiddenLine xmlns:a14="http://schemas.microsoft.com/office/drawing/2010/main" xmlns="" w="9525">
                   <a:solidFill>
                     <a:srgbClr val="000000"/>
                   </a:solidFill>
@@ -10344,7 +10347,7 @@
             </a:ln>
             <a:extLst>
               <a:ext uri="{91240B29-F687-4f45-9708-019B960494DF}">
-                <a14:hiddenLine xmlns="" xmlns:a14="http://schemas.microsoft.com/office/drawing/2010/main" w="9525">
+                <a14:hiddenLine xmlns:a14="http://schemas.microsoft.com/office/drawing/2010/main" xmlns="" w="9525">
                   <a:solidFill>
                     <a:srgbClr val="000000"/>
                   </a:solidFill>
@@ -10412,7 +10415,7 @@
             </a:ln>
             <a:extLst>
               <a:ext uri="{91240B29-F687-4f45-9708-019B960494DF}">
-                <a14:hiddenLine xmlns="" xmlns:a14="http://schemas.microsoft.com/office/drawing/2010/main" w="9525">
+                <a14:hiddenLine xmlns:a14="http://schemas.microsoft.com/office/drawing/2010/main" xmlns="" w="9525">
                   <a:solidFill>
                     <a:srgbClr val="000000"/>
                   </a:solidFill>
@@ -10528,7 +10531,7 @@
             </a:ln>
             <a:extLst>
               <a:ext uri="{91240B29-F687-4f45-9708-019B960494DF}">
-                <a14:hiddenLine xmlns="" xmlns:a14="http://schemas.microsoft.com/office/drawing/2010/main" w="9525">
+                <a14:hiddenLine xmlns:a14="http://schemas.microsoft.com/office/drawing/2010/main" xmlns="" w="9525">
                   <a:solidFill>
                     <a:srgbClr val="000000"/>
                   </a:solidFill>
@@ -10633,7 +10636,7 @@
             </a:ln>
             <a:extLst>
               <a:ext uri="{91240B29-F687-4f45-9708-019B960494DF}">
-                <a14:hiddenLine xmlns="" xmlns:a14="http://schemas.microsoft.com/office/drawing/2010/main" w="9525">
+                <a14:hiddenLine xmlns:a14="http://schemas.microsoft.com/office/drawing/2010/main" xmlns="" w="9525">
                   <a:solidFill>
                     <a:srgbClr val="000000"/>
                   </a:solidFill>
@@ -10701,7 +10704,7 @@
             </a:ln>
             <a:extLst>
               <a:ext uri="{91240B29-F687-4f45-9708-019B960494DF}">
-                <a14:hiddenLine xmlns="" xmlns:a14="http://schemas.microsoft.com/office/drawing/2010/main" w="9525">
+                <a14:hiddenLine xmlns:a14="http://schemas.microsoft.com/office/drawing/2010/main" xmlns="" w="9525">
                   <a:solidFill>
                     <a:srgbClr val="000000"/>
                   </a:solidFill>
@@ -10797,7 +10800,7 @@
             </a:ln>
             <a:extLst>
               <a:ext uri="{91240B29-F687-4f45-9708-019B960494DF}">
-                <a14:hiddenLine xmlns="" xmlns:a14="http://schemas.microsoft.com/office/drawing/2010/main" w="9525">
+                <a14:hiddenLine xmlns:a14="http://schemas.microsoft.com/office/drawing/2010/main" xmlns="" w="9525">
                   <a:solidFill>
                     <a:srgbClr val="000000"/>
                   </a:solidFill>
@@ -10865,7 +10868,7 @@
             </a:ln>
             <a:extLst>
               <a:ext uri="{91240B29-F687-4f45-9708-019B960494DF}">
-                <a14:hiddenLine xmlns="" xmlns:a14="http://schemas.microsoft.com/office/drawing/2010/main" w="9525">
+                <a14:hiddenLine xmlns:a14="http://schemas.microsoft.com/office/drawing/2010/main" xmlns="" w="9525">
                   <a:solidFill>
                     <a:srgbClr val="000000"/>
                   </a:solidFill>
@@ -10961,7 +10964,7 @@
             </a:ln>
             <a:extLst>
               <a:ext uri="{91240B29-F687-4f45-9708-019B960494DF}">
-                <a14:hiddenLine xmlns="" xmlns:a14="http://schemas.microsoft.com/office/drawing/2010/main" w="9525">
+                <a14:hiddenLine xmlns:a14="http://schemas.microsoft.com/office/drawing/2010/main" xmlns="" w="9525">
                   <a:solidFill>
                     <a:srgbClr val="000000"/>
                   </a:solidFill>
@@ -11032,7 +11035,7 @@
             </a:ln>
             <a:extLst>
               <a:ext uri="{91240B29-F687-4f45-9708-019B960494DF}">
-                <a14:hiddenLine xmlns="" xmlns:a14="http://schemas.microsoft.com/office/drawing/2010/main" w="9525">
+                <a14:hiddenLine xmlns:a14="http://schemas.microsoft.com/office/drawing/2010/main" xmlns="" w="9525">
                   <a:solidFill>
                     <a:srgbClr val="000000"/>
                   </a:solidFill>
@@ -11158,7 +11161,7 @@
             </a:ln>
             <a:extLst>
               <a:ext uri="{91240B29-F687-4f45-9708-019B960494DF}">
-                <a14:hiddenLine xmlns="" xmlns:a14="http://schemas.microsoft.com/office/drawing/2010/main" w="9525">
+                <a14:hiddenLine xmlns:a14="http://schemas.microsoft.com/office/drawing/2010/main" xmlns="" w="9525">
                   <a:solidFill>
                     <a:srgbClr val="000000"/>
                   </a:solidFill>
@@ -11531,8 +11534,8 @@
         </p:nvSpPr>
         <p:spPr>
           <a:xfrm>
-            <a:off x="4397202" y="252162"/>
-            <a:ext cx="3571056" cy="559134"/>
+            <a:off x="3421251" y="380320"/>
+            <a:ext cx="3524279" cy="1031248"/>
           </a:xfrm>
           <a:prstGeom prst="rect">
             <a:avLst/>
@@ -11641,7 +11644,7 @@
             </a:lvl9pPr>
           </a:lstStyle>
           <a:p>
-            <a:pPr marL="58464" algn="l">
+            <a:pPr marL="58464">
               <a:spcAft>
                 <a:spcPts val="600"/>
               </a:spcAft>
@@ -11652,27 +11655,27 @@
               </a:tabLst>
             </a:pPr>
             <a:r>
-              <a:rPr lang="en-GB" sz="1600" b="1" dirty="0" err="1">
+              <a:rPr lang="en-GB" sz="2400" b="1" dirty="0">
                 <a:solidFill>
                   <a:srgbClr val="134770"/>
                 </a:solidFill>
                 <a:latin typeface="Roboto" panose="02000000000000000000" pitchFamily="2" charset="0"/>
                 <a:ea typeface="Roboto" panose="02000000000000000000" pitchFamily="2" charset="0"/>
               </a:rPr>
-              <a:t>PBrain</a:t>
+              <a:t>Your custom </a:t>
             </a:r>
             <a:r>
-              <a:rPr lang="en-GB" sz="1600" b="1" dirty="0">
+              <a:rPr lang="en-GB" sz="2400" b="1" dirty="0" err="1">
                 <a:solidFill>
                   <a:srgbClr val="134770"/>
                 </a:solidFill>
                 <a:latin typeface="Roboto" panose="02000000000000000000" pitchFamily="2" charset="0"/>
                 <a:ea typeface="Roboto" panose="02000000000000000000" pitchFamily="2" charset="0"/>
               </a:rPr>
-              <a:t> lead generation</a:t>
+              <a:t>ChatGPT</a:t>
             </a:r>
             <a:br>
-              <a:rPr lang="en-GB" sz="1600" b="1" dirty="0">
+              <a:rPr lang="en-GB" sz="2400" b="1" dirty="0">
                 <a:solidFill>
                   <a:srgbClr val="134770"/>
                 </a:solidFill>
@@ -11681,26 +11684,16 @@
               </a:rPr>
             </a:br>
             <a:r>
-              <a:rPr lang="en-GB" sz="1600" b="1" dirty="0" err="1">
+              <a:rPr lang="en-GB" sz="2400" b="1" dirty="0">
                 <a:solidFill>
                   <a:srgbClr val="134770"/>
                 </a:solidFill>
                 <a:latin typeface="Roboto" panose="02000000000000000000" pitchFamily="2" charset="0"/>
                 <a:ea typeface="Roboto" panose="02000000000000000000" pitchFamily="2" charset="0"/>
               </a:rPr>
-              <a:t>ChatGPT</a:t>
+              <a:t>in a click</a:t>
             </a:r>
-            <a:r>
-              <a:rPr lang="en-GB" sz="1600" b="1" dirty="0">
-                <a:solidFill>
-                  <a:srgbClr val="134770"/>
-                </a:solidFill>
-                <a:latin typeface="Roboto" panose="02000000000000000000" pitchFamily="2" charset="0"/>
-                <a:ea typeface="Roboto" panose="02000000000000000000" pitchFamily="2" charset="0"/>
-              </a:rPr>
-              <a:t> chatbot</a:t>
-            </a:r>
-            <a:endParaRPr lang="en-US" sz="1600" b="1" dirty="0">
+            <a:endParaRPr lang="en-US" sz="2400" b="1" dirty="0">
               <a:solidFill>
                 <a:srgbClr val="134770"/>
               </a:solidFill>
@@ -11724,7 +11717,7 @@
         </p:nvGrpSpPr>
         <p:grpSpPr>
           <a:xfrm>
-            <a:off x="5460381" y="1952719"/>
+            <a:off x="6181052" y="1952719"/>
             <a:ext cx="826274" cy="270476"/>
             <a:chOff x="8408784" y="2309441"/>
             <a:chExt cx="2414605" cy="790407"/>
@@ -11929,155 +11922,6 @@
           </p:txBody>
         </p:sp>
       </p:grpSp>
-      <p:sp>
-        <p:nvSpPr>
-          <p:cNvPr id="6" name="Text Placeholder 2">
-            <a:extLst>
-              <a:ext uri="{FF2B5EF4-FFF2-40B4-BE49-F238E27FC236}">
-                <a16:creationId xmlns:a16="http://schemas.microsoft.com/office/drawing/2014/main" id="{A94A61AC-0510-4939-AF35-0C97B051142D}"/>
-              </a:ext>
-            </a:extLst>
-          </p:cNvPr>
-          <p:cNvSpPr txBox="1">
-            <a:spLocks/>
-          </p:cNvSpPr>
-          <p:nvPr/>
-        </p:nvSpPr>
-        <p:spPr>
-          <a:xfrm>
-            <a:off x="4397202" y="950082"/>
-            <a:ext cx="3571056" cy="559134"/>
-          </a:xfrm>
-          <a:prstGeom prst="rect">
-            <a:avLst/>
-          </a:prstGeom>
-          <a:noFill/>
-        </p:spPr>
-        <p:txBody>
-          <a:bodyPr vert="horz" lIns="21340" tIns="10670" rIns="21340" bIns="10670" rtlCol="0" anchor="t">
-            <a:noAutofit/>
-          </a:bodyPr>
-          <a:lstStyle>
-            <a:defPPr>
-              <a:defRPr lang="en-US"/>
-            </a:defPPr>
-            <a:lvl1pPr marL="0" algn="r" defTabSz="914400" rtl="0" eaLnBrk="1" latinLnBrk="0" hangingPunct="1">
-              <a:defRPr sz="1200" kern="1200">
-                <a:solidFill>
-                  <a:schemeClr val="tx1">
-                    <a:tint val="75000"/>
-                  </a:schemeClr>
-                </a:solidFill>
-                <a:latin typeface="+mn-lt"/>
-                <a:ea typeface="+mn-ea"/>
-                <a:cs typeface="+mn-cs"/>
-              </a:defRPr>
-            </a:lvl1pPr>
-            <a:lvl2pPr marL="457200" algn="l" defTabSz="914400" rtl="0" eaLnBrk="1" latinLnBrk="0" hangingPunct="1">
-              <a:defRPr sz="1800" kern="1200">
-                <a:solidFill>
-                  <a:schemeClr val="tx1"/>
-                </a:solidFill>
-                <a:latin typeface="+mn-lt"/>
-                <a:ea typeface="+mn-ea"/>
-                <a:cs typeface="+mn-cs"/>
-              </a:defRPr>
-            </a:lvl2pPr>
-            <a:lvl3pPr marL="914400" algn="l" defTabSz="914400" rtl="0" eaLnBrk="1" latinLnBrk="0" hangingPunct="1">
-              <a:defRPr sz="1800" kern="1200">
-                <a:solidFill>
-                  <a:schemeClr val="tx1"/>
-                </a:solidFill>
-                <a:latin typeface="+mn-lt"/>
-                <a:ea typeface="+mn-ea"/>
-                <a:cs typeface="+mn-cs"/>
-              </a:defRPr>
-            </a:lvl3pPr>
-            <a:lvl4pPr marL="1371600" algn="l" defTabSz="914400" rtl="0" eaLnBrk="1" latinLnBrk="0" hangingPunct="1">
-              <a:defRPr sz="1800" kern="1200">
-                <a:solidFill>
-                  <a:schemeClr val="tx1"/>
-                </a:solidFill>
-                <a:latin typeface="+mn-lt"/>
-                <a:ea typeface="+mn-ea"/>
-                <a:cs typeface="+mn-cs"/>
-              </a:defRPr>
-            </a:lvl4pPr>
-            <a:lvl5pPr marL="1828800" algn="l" defTabSz="914400" rtl="0" eaLnBrk="1" latinLnBrk="0" hangingPunct="1">
-              <a:defRPr sz="1800" kern="1200">
-                <a:solidFill>
-                  <a:schemeClr val="tx1"/>
-                </a:solidFill>
-                <a:latin typeface="+mn-lt"/>
-                <a:ea typeface="+mn-ea"/>
-                <a:cs typeface="+mn-cs"/>
-              </a:defRPr>
-            </a:lvl5pPr>
-            <a:lvl6pPr marL="2286000" algn="l" defTabSz="914400" rtl="0" eaLnBrk="1" latinLnBrk="0" hangingPunct="1">
-              <a:defRPr sz="1800" kern="1200">
-                <a:solidFill>
-                  <a:schemeClr val="tx1"/>
-                </a:solidFill>
-                <a:latin typeface="+mn-lt"/>
-                <a:ea typeface="+mn-ea"/>
-                <a:cs typeface="+mn-cs"/>
-              </a:defRPr>
-            </a:lvl6pPr>
-            <a:lvl7pPr marL="2743200" algn="l" defTabSz="914400" rtl="0" eaLnBrk="1" latinLnBrk="0" hangingPunct="1">
-              <a:defRPr sz="1800" kern="1200">
-                <a:solidFill>
-                  <a:schemeClr val="tx1"/>
-                </a:solidFill>
-                <a:latin typeface="+mn-lt"/>
-                <a:ea typeface="+mn-ea"/>
-                <a:cs typeface="+mn-cs"/>
-              </a:defRPr>
-            </a:lvl7pPr>
-            <a:lvl8pPr marL="3200400" algn="l" defTabSz="914400" rtl="0" eaLnBrk="1" latinLnBrk="0" hangingPunct="1">
-              <a:defRPr sz="1800" kern="1200">
-                <a:solidFill>
-                  <a:schemeClr val="tx1"/>
-                </a:solidFill>
-                <a:latin typeface="+mn-lt"/>
-                <a:ea typeface="+mn-ea"/>
-                <a:cs typeface="+mn-cs"/>
-              </a:defRPr>
-            </a:lvl8pPr>
-            <a:lvl9pPr marL="3657600" algn="l" defTabSz="914400" rtl="0" eaLnBrk="1" latinLnBrk="0" hangingPunct="1">
-              <a:defRPr sz="1800" kern="1200">
-                <a:solidFill>
-                  <a:schemeClr val="tx1"/>
-                </a:solidFill>
-                <a:latin typeface="+mn-lt"/>
-                <a:ea typeface="+mn-ea"/>
-                <a:cs typeface="+mn-cs"/>
-              </a:defRPr>
-            </a:lvl9pPr>
-          </a:lstStyle>
-          <a:p>
-            <a:pPr marL="58464" algn="l">
-              <a:spcAft>
-                <a:spcPts val="600"/>
-              </a:spcAft>
-              <a:tabLst>
-                <a:tab pos="625476" algn="l"/>
-                <a:tab pos="2782888" algn="l"/>
-                <a:tab pos="3321050" algn="l"/>
-              </a:tabLst>
-            </a:pPr>
-            <a:r>
-              <a:rPr lang="en-GB" dirty="0">
-                <a:solidFill>
-                  <a:srgbClr val="134770"/>
-                </a:solidFill>
-                <a:latin typeface="Roboto" panose="02000000000000000000" pitchFamily="2" charset="0"/>
-                <a:ea typeface="Roboto" panose="02000000000000000000" pitchFamily="2" charset="0"/>
-              </a:rPr>
-              <a:t>Engage and convert visitors into leads</a:t>
-            </a:r>
-          </a:p>
-        </p:txBody>
-      </p:sp>
       <p:pic>
         <p:nvPicPr>
           <p:cNvPr id="7" name="Picture 6">

</xml_diff>